<commit_message>
todo and image cleanup
</commit_message>
<xml_diff>
--- a/Presentation/Tristan Slides.pptx
+++ b/Presentation/Tristan Slides.pptx
@@ -5,18 +5,20 @@
     <p:sldMasterId id="2147485011" r:id="rId4"/>
   </p:sldMasterIdLst>
   <p:notesMasterIdLst>
-    <p:notesMasterId r:id="rId6"/>
+    <p:notesMasterId r:id="rId8"/>
   </p:notesMasterIdLst>
   <p:handoutMasterIdLst>
-    <p:handoutMasterId r:id="rId7"/>
+    <p:handoutMasterId r:id="rId9"/>
   </p:handoutMasterIdLst>
   <p:sldIdLst>
     <p:sldId id="267" r:id="rId5"/>
+    <p:sldId id="268" r:id="rId6"/>
+    <p:sldId id="269" r:id="rId7"/>
   </p:sldIdLst>
   <p:sldSz cx="12192000" cy="6858000"/>
   <p:notesSz cx="6858000" cy="9144000"/>
   <p:custDataLst>
-    <p:tags r:id="rId8"/>
+    <p:tags r:id="rId10"/>
   </p:custDataLst>
   <p:defaultTextStyle>
     <a:defPPr>
@@ -19068,11 +19070,258 @@
         <p:spPr/>
         <p:txBody>
           <a:bodyPr>
-            <a:normAutofit/>
+            <a:normAutofit fontScale="32500" lnSpcReduction="20000"/>
           </a:bodyPr>
           <a:lstStyle/>
           <a:p>
+            <a:r>
+              <a:rPr lang="en-US" dirty="0"/>
+              <a:t>RQ1. Holding $N$ and mean degree $\</a:t>
+            </a:r>
+            <a:r>
+              <a:rPr lang="en-US" dirty="0" err="1"/>
+              <a:t>langle</a:t>
+            </a:r>
+            <a:r>
+              <a:rPr lang="en-US" dirty="0"/>
+              <a:t> k\</a:t>
+            </a:r>
+            <a:r>
+              <a:rPr lang="en-US" dirty="0" err="1"/>
+              <a:t>rangle</a:t>
+            </a:r>
+            <a:r>
+              <a:rPr lang="en-US" dirty="0"/>
+              <a:t>$ fixed, how does network architecture (e.g., lattice, ER, WS, BA, DC-SBM) affect long-run cooperation and local assortment?</a:t>
+            </a:r>
+          </a:p>
+          <a:p>
             <a:endParaRPr lang="en-US" dirty="0"/>
+          </a:p>
+          <a:p>
+            <a:r>
+              <a:rPr lang="en-US" dirty="0"/>
+              <a:t>Measurements.</a:t>
+            </a:r>
+          </a:p>
+          <a:p>
+            <a:r>
+              <a:rPr lang="en-US" dirty="0"/>
+              <a:t>- Long-run cooperation level $\bar{C}$.</a:t>
+            </a:r>
+          </a:p>
+          <a:p>
+            <a:r>
+              <a:rPr lang="en-US" dirty="0"/>
+              <a:t>- Neighbor cooperation (assortment). Let $\</a:t>
+            </a:r>
+            <a:r>
+              <a:rPr lang="en-US" dirty="0" err="1"/>
+              <a:t>mathcal</a:t>
+            </a:r>
+            <a:r>
+              <a:rPr lang="en-US" dirty="0"/>
+              <a:t>{N}(</a:t>
+            </a:r>
+            <a:r>
+              <a:rPr lang="en-US" dirty="0" err="1"/>
+              <a:t>i</a:t>
+            </a:r>
+            <a:r>
+              <a:rPr lang="en-US" dirty="0"/>
+              <a:t>)$ be neighbors of $</a:t>
+            </a:r>
+            <a:r>
+              <a:rPr lang="en-US" dirty="0" err="1"/>
+              <a:t>i</a:t>
+            </a:r>
+            <a:r>
+              <a:rPr lang="en-US" dirty="0"/>
+              <a:t>$ and $</a:t>
+            </a:r>
+            <a:r>
+              <a:rPr lang="en-US" dirty="0" err="1"/>
+              <a:t>k_i</a:t>
+            </a:r>
+            <a:r>
+              <a:rPr lang="en-US" dirty="0"/>
+              <a:t>=|\</a:t>
+            </a:r>
+            <a:r>
+              <a:rPr lang="en-US" dirty="0" err="1"/>
+              <a:t>mathcal</a:t>
+            </a:r>
+            <a:r>
+              <a:rPr lang="en-US" dirty="0"/>
+              <a:t>{N}(</a:t>
+            </a:r>
+            <a:r>
+              <a:rPr lang="en-US" dirty="0" err="1"/>
+              <a:t>i</a:t>
+            </a:r>
+            <a:r>
+              <a:rPr lang="en-US" dirty="0"/>
+              <a:t>)|$. Define neighbor mean</a:t>
+            </a:r>
+          </a:p>
+          <a:p>
+            <a:endParaRPr lang="en-US" dirty="0"/>
+          </a:p>
+          <a:p>
+            <a:r>
+              <a:rPr lang="en-US" dirty="0"/>
+              <a:t>$$</a:t>
+            </a:r>
+          </a:p>
+          <a:p>
+            <a:r>
+              <a:rPr lang="en-US" dirty="0"/>
+              <a:t>\bar{x}_{\</a:t>
+            </a:r>
+            <a:r>
+              <a:rPr lang="en-US" dirty="0" err="1"/>
+              <a:t>mathcal</a:t>
+            </a:r>
+            <a:r>
+              <a:rPr lang="en-US" dirty="0"/>
+              <a:t>{N}(</a:t>
+            </a:r>
+            <a:r>
+              <a:rPr lang="en-US" dirty="0" err="1"/>
+              <a:t>i</a:t>
+            </a:r>
+            <a:r>
+              <a:rPr lang="en-US" dirty="0"/>
+              <a:t>)}(t)=\frac{1}{</a:t>
+            </a:r>
+            <a:r>
+              <a:rPr lang="en-US" dirty="0" err="1"/>
+              <a:t>k_i</a:t>
+            </a:r>
+            <a:r>
+              <a:rPr lang="en-US" dirty="0"/>
+              <a:t>} \sum_{j \in \</a:t>
+            </a:r>
+            <a:r>
+              <a:rPr lang="en-US" dirty="0" err="1"/>
+              <a:t>mathcal</a:t>
+            </a:r>
+            <a:r>
+              <a:rPr lang="en-US" dirty="0"/>
+              <a:t>{N}(</a:t>
+            </a:r>
+            <a:r>
+              <a:rPr lang="en-US" dirty="0" err="1"/>
+              <a:t>i</a:t>
+            </a:r>
+            <a:r>
+              <a:rPr lang="en-US" dirty="0"/>
+              <a:t>)} </a:t>
+            </a:r>
+            <a:r>
+              <a:rPr lang="en-US" dirty="0" err="1"/>
+              <a:t>x_j</a:t>
+            </a:r>
+            <a:r>
+              <a:rPr lang="en-US" dirty="0"/>
+              <a:t>(t) .</a:t>
+            </a:r>
+          </a:p>
+          <a:p>
+            <a:r>
+              <a:rPr lang="en-US" dirty="0"/>
+              <a:t>$$</a:t>
+            </a:r>
+          </a:p>
+          <a:p>
+            <a:endParaRPr lang="en-US" dirty="0"/>
+          </a:p>
+          <a:p>
+            <a:endParaRPr lang="en-US" dirty="0"/>
+          </a:p>
+          <a:p>
+            <a:r>
+              <a:rPr lang="en-US" dirty="0"/>
+              <a:t>Define Pearson correlation</a:t>
+            </a:r>
+          </a:p>
+          <a:p>
+            <a:endParaRPr lang="en-US" dirty="0"/>
+          </a:p>
+          <a:p>
+            <a:r>
+              <a:rPr lang="en-US" dirty="0"/>
+              <a:t>$$</a:t>
+            </a:r>
+          </a:p>
+          <a:p>
+            <a:r>
+              <a:rPr lang="en-US" dirty="0"/>
+              <a:t>r(t)=\</a:t>
+            </a:r>
+            <a:r>
+              <a:rPr lang="en-US" dirty="0" err="1"/>
+              <a:t>operatorname</a:t>
+            </a:r>
+            <a:r>
+              <a:rPr lang="en-US" dirty="0"/>
+              <a:t>{Corr}\left(</a:t>
+            </a:r>
+            <a:r>
+              <a:rPr lang="en-US" dirty="0" err="1"/>
+              <a:t>x_i</a:t>
+            </a:r>
+            <a:r>
+              <a:rPr lang="en-US" dirty="0"/>
+              <a:t>(t), \bar{x}_{\</a:t>
+            </a:r>
+            <a:r>
+              <a:rPr lang="en-US" dirty="0" err="1"/>
+              <a:t>mathcal</a:t>
+            </a:r>
+            <a:r>
+              <a:rPr lang="en-US" dirty="0"/>
+              <a:t>{N}(</a:t>
+            </a:r>
+            <a:r>
+              <a:rPr lang="en-US" dirty="0" err="1"/>
+              <a:t>i</a:t>
+            </a:r>
+            <a:r>
+              <a:rPr lang="en-US" dirty="0"/>
+              <a:t>)}(t)\right)_{</a:t>
+            </a:r>
+            <a:r>
+              <a:rPr lang="en-US" dirty="0" err="1"/>
+              <a:t>i</a:t>
+            </a:r>
+            <a:r>
+              <a:rPr lang="en-US" dirty="0"/>
+              <a:t>=1}^N .</a:t>
+            </a:r>
+          </a:p>
+          <a:p>
+            <a:r>
+              <a:rPr lang="en-US" dirty="0"/>
+              <a:t>$$</a:t>
+            </a:r>
+          </a:p>
+          <a:p>
+            <a:endParaRPr lang="en-US" dirty="0"/>
+          </a:p>
+          <a:p>
+            <a:r>
+              <a:rPr lang="en-US" dirty="0"/>
+              <a:t>- Report network statistics (as controls/mediators): clustering coefficient, average shortest path length (on the giant component), degree heterogeneity (e.g., $\</a:t>
+            </a:r>
+            <a:r>
+              <a:rPr lang="en-US" dirty="0" err="1"/>
+              <a:t>mathrm</a:t>
+            </a:r>
+            <a:r>
+              <a:rPr lang="en-US" dirty="0"/>
+              <a:t>{CV}(k)$ ), modularity (if applicable).</a:t>
+            </a:r>
           </a:p>
         </p:txBody>
       </p:sp>
@@ -19088,10 +19337,16 @@
         </p:nvSpPr>
         <p:spPr/>
         <p:txBody>
-          <a:bodyPr/>
+          <a:bodyPr>
+            <a:normAutofit fontScale="90000"/>
+          </a:bodyPr>
           <a:lstStyle/>
           <a:p>
-            <a:endParaRPr lang="en-US" dirty="0"/>
+            <a:r>
+              <a:rPr lang="en-GB" dirty="0"/>
+              <a:t>RQ1: How do payoff matrices and strategies interact with network structure in terms of the emergence of cooperation?</a:t>
+            </a:r>
+            <a:endParaRPr lang="en-GB" b="0" dirty="0"/>
           </a:p>
         </p:txBody>
       </p:sp>
@@ -19104,6 +19359,330 @@
   </p:cSld>
   <p:clrMapOvr>
     <a:overrideClrMapping bg1="lt1" tx1="dk1" bg2="lt2" tx2="dk2" accent1="accent1" accent2="accent2" accent3="accent3" accent4="accent4" accent5="accent5" accent6="accent6" hlink="hlink" folHlink="folHlink"/>
+  </p:clrMapOvr>
+</p:sld>
+</file>
+
+<file path=ppt/slides/slide2.xml><?xml version="1.0" encoding="utf-8"?>
+<p:sld xmlns:a="http://schemas.openxmlformats.org/drawingml/2006/main" xmlns:r="http://schemas.openxmlformats.org/officeDocument/2006/relationships" xmlns:p="http://schemas.openxmlformats.org/presentationml/2006/main">
+  <p:cSld>
+    <p:spTree>
+      <p:nvGrpSpPr>
+        <p:cNvPr id="1" name=""/>
+        <p:cNvGrpSpPr/>
+        <p:nvPr/>
+      </p:nvGrpSpPr>
+      <p:grpSpPr>
+        <a:xfrm>
+          <a:off x="0" y="0"/>
+          <a:ext cx="0" cy="0"/>
+          <a:chOff x="0" y="0"/>
+          <a:chExt cx="0" cy="0"/>
+        </a:xfrm>
+      </p:grpSpPr>
+      <p:sp>
+        <p:nvSpPr>
+          <p:cNvPr id="2" name="Content Placeholder 1">
+            <a:extLst>
+              <a:ext uri="{FF2B5EF4-FFF2-40B4-BE49-F238E27FC236}">
+                <a16:creationId xmlns:a16="http://schemas.microsoft.com/office/drawing/2014/main" id="{E53FC4FC-A246-571A-2064-8411EE6F167C}"/>
+              </a:ext>
+            </a:extLst>
+          </p:cNvPr>
+          <p:cNvSpPr>
+            <a:spLocks noGrp="1"/>
+          </p:cNvSpPr>
+          <p:nvPr>
+            <p:ph idx="1"/>
+          </p:nvPr>
+        </p:nvSpPr>
+        <p:spPr/>
+        <p:txBody>
+          <a:bodyPr>
+            <a:normAutofit lnSpcReduction="10000"/>
+          </a:bodyPr>
+          <a:lstStyle/>
+          <a:p>
+            <a:r>
+              <a:rPr lang="en-US" dirty="0"/>
+              <a:t>● Clustering helps: Networks with higher clustering support higher long-run cooperation</a:t>
+            </a:r>
+            <a:br>
+              <a:rPr lang="en-US" dirty="0"/>
+            </a:br>
+            <a:r>
+              <a:rPr lang="en-US" dirty="0"/>
+              <a:t>than random networks, holding average degree constant.</a:t>
+            </a:r>
+            <a:br>
+              <a:rPr lang="en-US" dirty="0"/>
+            </a:br>
+            <a:r>
+              <a:rPr lang="en-US" dirty="0"/>
+              <a:t>● Cooperation increases when cooperators connected to cooperators, measured by</a:t>
+            </a:r>
+            <a:br>
+              <a:rPr lang="en-US" dirty="0"/>
+            </a:br>
+            <a:r>
+              <a:rPr lang="en-US" dirty="0"/>
+              <a:t>positive covariance between an agent’s action and neighbor actions.</a:t>
+            </a:r>
+            <a:br>
+              <a:rPr lang="en-US" dirty="0"/>
+            </a:br>
+            <a:r>
+              <a:rPr lang="en-US" dirty="0"/>
+              <a:t>● There exists a parameter region where cooperative clusters transition from many</a:t>
+            </a:r>
+            <a:br>
+              <a:rPr lang="en-US" dirty="0"/>
+            </a:br>
+            <a:r>
+              <a:rPr lang="en-US" dirty="0"/>
+              <a:t>small components to a giant connected cooperative component.</a:t>
+            </a:r>
+          </a:p>
+          <a:p>
+            <a:br>
+              <a:rPr lang="en-US" dirty="0"/>
+            </a:br>
+            <a:endParaRPr lang="en-US" dirty="0"/>
+          </a:p>
+          <a:p>
+            <a:endParaRPr lang="en-US" dirty="0"/>
+          </a:p>
+        </p:txBody>
+      </p:sp>
+      <p:sp>
+        <p:nvSpPr>
+          <p:cNvPr id="3" name="Title 2">
+            <a:extLst>
+              <a:ext uri="{FF2B5EF4-FFF2-40B4-BE49-F238E27FC236}">
+                <a16:creationId xmlns:a16="http://schemas.microsoft.com/office/drawing/2014/main" id="{34964F53-9A15-4FE3-0CC1-D5BF6B8210C6}"/>
+              </a:ext>
+            </a:extLst>
+          </p:cNvPr>
+          <p:cNvSpPr>
+            <a:spLocks noGrp="1"/>
+          </p:cNvSpPr>
+          <p:nvPr>
+            <p:ph type="title"/>
+          </p:nvPr>
+        </p:nvSpPr>
+        <p:spPr/>
+        <p:txBody>
+          <a:bodyPr/>
+          <a:lstStyle/>
+          <a:p>
+            <a:endParaRPr lang="en-US"/>
+          </a:p>
+        </p:txBody>
+      </p:sp>
+    </p:spTree>
+    <p:extLst>
+      <p:ext uri="{BB962C8B-B14F-4D97-AF65-F5344CB8AC3E}">
+        <p14:creationId xmlns:p14="http://schemas.microsoft.com/office/powerpoint/2010/main" val="1988263980"/>
+      </p:ext>
+    </p:extLst>
+  </p:cSld>
+  <p:clrMapOvr>
+    <a:masterClrMapping/>
+  </p:clrMapOvr>
+</p:sld>
+</file>
+
+<file path=ppt/slides/slide3.xml><?xml version="1.0" encoding="utf-8"?>
+<p:sld xmlns:a="http://schemas.openxmlformats.org/drawingml/2006/main" xmlns:r="http://schemas.openxmlformats.org/officeDocument/2006/relationships" xmlns:p="http://schemas.openxmlformats.org/presentationml/2006/main">
+  <p:cSld>
+    <p:spTree>
+      <p:nvGrpSpPr>
+        <p:cNvPr id="1" name=""/>
+        <p:cNvGrpSpPr/>
+        <p:nvPr/>
+      </p:nvGrpSpPr>
+      <p:grpSpPr>
+        <a:xfrm>
+          <a:off x="0" y="0"/>
+          <a:ext cx="0" cy="0"/>
+          <a:chOff x="0" y="0"/>
+          <a:chExt cx="0" cy="0"/>
+        </a:xfrm>
+      </p:grpSpPr>
+      <p:sp>
+        <p:nvSpPr>
+          <p:cNvPr id="2" name="Content Placeholder 1">
+            <a:extLst>
+              <a:ext uri="{FF2B5EF4-FFF2-40B4-BE49-F238E27FC236}">
+                <a16:creationId xmlns:a16="http://schemas.microsoft.com/office/drawing/2014/main" id="{223D4FCB-242F-03C4-EEE5-8EFC9A913D7A}"/>
+              </a:ext>
+            </a:extLst>
+          </p:cNvPr>
+          <p:cNvSpPr>
+            <a:spLocks noGrp="1"/>
+          </p:cNvSpPr>
+          <p:nvPr>
+            <p:ph idx="1"/>
+          </p:nvPr>
+        </p:nvSpPr>
+        <p:spPr/>
+        <p:txBody>
+          <a:bodyPr>
+            <a:normAutofit fontScale="77500" lnSpcReduction="20000"/>
+          </a:bodyPr>
+          <a:lstStyle/>
+          <a:p>
+            <a:r>
+              <a:rPr lang="en-GB" dirty="0"/>
+              <a:t>Short description</a:t>
+            </a:r>
+            <a:br>
+              <a:rPr lang="en-GB" dirty="0"/>
+            </a:br>
+            <a:r>
+              <a:rPr lang="en-GB" dirty="0"/>
+              <a:t>Studying the emergence of cooperation through simulation of the iterated prisoner’s dilemma</a:t>
+            </a:r>
+            <a:br>
+              <a:rPr lang="en-GB" dirty="0"/>
+            </a:br>
+            <a:r>
+              <a:rPr lang="en-GB" dirty="0"/>
+              <a:t>on networks with varying architectures (e.g., grid, Erdős–Rényi, small-world, DC-SBM). We</a:t>
+            </a:r>
+            <a:br>
+              <a:rPr lang="en-GB" dirty="0"/>
+            </a:br>
+            <a:r>
+              <a:rPr lang="en-GB" dirty="0"/>
+              <a:t>will vary initial conditions, agent strategies (e.g., Tit-for-Tat, imitation/mimesis), and payoff</a:t>
+            </a:r>
+            <a:br>
+              <a:rPr lang="en-GB" dirty="0"/>
+            </a:br>
+            <a:r>
+              <a:rPr lang="en-GB" dirty="0"/>
+              <a:t>parameters, and measure how these choices affect the formation, size, and persistence of</a:t>
+            </a:r>
+            <a:br>
+              <a:rPr lang="en-GB" dirty="0"/>
+            </a:br>
+            <a:r>
+              <a:rPr lang="en-GB" dirty="0"/>
+              <a:t>cooperative clusters. If time allows, we will also look into endogenous rewiring (cooperative</a:t>
+            </a:r>
+            <a:br>
+              <a:rPr lang="en-GB" dirty="0"/>
+            </a:br>
+            <a:r>
+              <a:rPr lang="en-GB" dirty="0"/>
+              <a:t>nodes preferentially attaching to each-other) and its implications (such as potential SOC).</a:t>
+            </a:r>
+            <a:br>
+              <a:rPr lang="en-GB" dirty="0"/>
+            </a:br>
+            <a:r>
+              <a:rPr lang="en-GB" dirty="0"/>
+              <a:t>Research questions and hypotheses</a:t>
+            </a:r>
+            <a:br>
+              <a:rPr lang="en-GB" dirty="0"/>
+            </a:br>
+            <a:r>
+              <a:rPr lang="en-GB" dirty="0"/>
+              <a:t>Can sustained cooperative behaviour emerge endogenously from networked interactions?</a:t>
+            </a:r>
+            <a:br>
+              <a:rPr lang="en-GB" dirty="0"/>
+            </a:br>
+            <a:r>
+              <a:rPr lang="en-GB" dirty="0"/>
+              <a:t>● What are the requirements for such emergence?</a:t>
+            </a:r>
+            <a:br>
+              <a:rPr lang="en-GB" dirty="0"/>
+            </a:br>
+            <a:r>
+              <a:rPr lang="en-GB" dirty="0"/>
+              <a:t>● Which network architectures are more or less suited for emerging cooperation?</a:t>
+            </a:r>
+            <a:br>
+              <a:rPr lang="en-GB" dirty="0"/>
+            </a:br>
+            <a:r>
+              <a:rPr lang="en-GB" dirty="0"/>
+              <a:t>● How does the cluster size of cooperating clusters change?</a:t>
+            </a:r>
+            <a:br>
+              <a:rPr lang="en-GB" dirty="0"/>
+            </a:br>
+            <a:r>
+              <a:rPr lang="en-GB" dirty="0"/>
+              <a:t>● Are there critical points or phase transitions?</a:t>
+            </a:r>
+            <a:br>
+              <a:rPr lang="en-GB" dirty="0"/>
+            </a:br>
+            <a:r>
+              <a:rPr lang="en-GB" dirty="0"/>
+              <a:t>● Does percolation appear for certain parameter levels? If so, which?</a:t>
+            </a:r>
+            <a:br>
+              <a:rPr lang="en-GB" dirty="0"/>
+            </a:br>
+            <a:r>
+              <a:rPr lang="en-GB" dirty="0"/>
+              <a:t>● How do network structure and parameters affect the correlation/covariance between</a:t>
+            </a:r>
+            <a:br>
+              <a:rPr lang="en-GB" dirty="0"/>
+            </a:br>
+            <a:r>
+              <a:rPr lang="en-GB" dirty="0"/>
+              <a:t>an agent’s cooperation and the cooperation of its </a:t>
+            </a:r>
+            <a:r>
+              <a:rPr lang="en-GB" dirty="0" err="1"/>
+              <a:t>neighbors</a:t>
+            </a:r>
+            <a:endParaRPr lang="en-US" dirty="0"/>
+          </a:p>
+        </p:txBody>
+      </p:sp>
+      <p:sp>
+        <p:nvSpPr>
+          <p:cNvPr id="3" name="Title 2">
+            <a:extLst>
+              <a:ext uri="{FF2B5EF4-FFF2-40B4-BE49-F238E27FC236}">
+                <a16:creationId xmlns:a16="http://schemas.microsoft.com/office/drawing/2014/main" id="{8277FEE6-D4D1-8A22-4C6C-BA4DBD40C983}"/>
+              </a:ext>
+            </a:extLst>
+          </p:cNvPr>
+          <p:cNvSpPr>
+            <a:spLocks noGrp="1"/>
+          </p:cNvSpPr>
+          <p:nvPr>
+            <p:ph type="title"/>
+          </p:nvPr>
+        </p:nvSpPr>
+        <p:spPr/>
+        <p:txBody>
+          <a:bodyPr/>
+          <a:lstStyle/>
+          <a:p>
+            <a:endParaRPr lang="en-US"/>
+          </a:p>
+        </p:txBody>
+      </p:sp>
+    </p:spTree>
+    <p:extLst>
+      <p:ext uri="{BB962C8B-B14F-4D97-AF65-F5344CB8AC3E}">
+        <p14:creationId xmlns:p14="http://schemas.microsoft.com/office/powerpoint/2010/main" val="457993412"/>
+      </p:ext>
+    </p:extLst>
+  </p:cSld>
+  <p:clrMapOvr>
+    <a:masterClrMapping/>
   </p:clrMapOvr>
 </p:sld>
 </file>
@@ -19892,6 +20471,12 @@
 </file>
 
 <file path=customXml/item2.xml><?xml version="1.0" encoding="utf-8"?>
+<p:properties xmlns:p="http://schemas.microsoft.com/office/2006/metadata/properties" xmlns:xsi="http://www.w3.org/2001/XMLSchema-instance" xmlns:pc="http://schemas.microsoft.com/office/infopath/2007/PartnerControls">
+  <documentManagement/>
+</p:properties>
+</file>
+
+<file path=customXml/item3.xml><?xml version="1.0" encoding="utf-8"?>
 <ct:contentTypeSchema xmlns:ct="http://schemas.microsoft.com/office/2006/metadata/contentType" xmlns:ma="http://schemas.microsoft.com/office/2006/metadata/properties/metaAttributes" ct:_="" ma:_="" ma:contentTypeName="Document" ma:contentTypeID="0x010100A5EB26C7979E7242A3043123CA461D04" ma:contentTypeVersion="4" ma:contentTypeDescription="Een nieuw document maken." ma:contentTypeScope="" ma:versionID="947128032fa33d4217b1c9b8a9506e64">
   <xsd:schema xmlns:xsd="http://www.w3.org/2001/XMLSchema" xmlns:xs="http://www.w3.org/2001/XMLSchema" xmlns:p="http://schemas.microsoft.com/office/2006/metadata/properties" xmlns:ns2="2014d3d7-ed9a-405e-96dc-0a26f9a75b1e" targetNamespace="http://schemas.microsoft.com/office/2006/metadata/properties" ma:root="true" ma:fieldsID="a9155798b549f333f86d83e0e3ced9ae" ns2:_="">
     <xsd:import namespace="2014d3d7-ed9a-405e-96dc-0a26f9a75b1e"/>
@@ -20035,12 +20620,6 @@
 </ct:contentTypeSchema>
 </file>
 
-<file path=customXml/item3.xml><?xml version="1.0" encoding="utf-8"?>
-<p:properties xmlns:p="http://schemas.microsoft.com/office/2006/metadata/properties" xmlns:xsi="http://www.w3.org/2001/XMLSchema-instance" xmlns:pc="http://schemas.microsoft.com/office/infopath/2007/PartnerControls">
-  <documentManagement/>
-</p:properties>
-</file>
-
 <file path=customXml/itemProps1.xml><?xml version="1.0" encoding="utf-8"?>
 <ds:datastoreItem xmlns:ds="http://schemas.openxmlformats.org/officeDocument/2006/customXml" ds:itemID="{E740B4EE-7306-4015-AD25-B4E5484321A5}">
   <ds:schemaRefs>
@@ -20050,6 +20629,23 @@
 </file>
 
 <file path=customXml/itemProps2.xml><?xml version="1.0" encoding="utf-8"?>
+<ds:datastoreItem xmlns:ds="http://schemas.openxmlformats.org/officeDocument/2006/customXml" ds:itemID="{69DA0326-C6F9-40A3-894F-6061EE46E132}">
+  <ds:schemaRefs>
+    <ds:schemaRef ds:uri="http://schemas.microsoft.com/office/2006/metadata/properties"/>
+    <ds:schemaRef ds:uri="f2760952-b3bb-408f-ace6-eb1e07642b86"/>
+    <ds:schemaRef ds:uri="http://purl.org/dc/terms/"/>
+    <ds:schemaRef ds:uri="http://schemas.openxmlformats.org/package/2006/metadata/core-properties"/>
+    <ds:schemaRef ds:uri="http://schemas.microsoft.com/office/2006/documentManagement/types"/>
+    <ds:schemaRef ds:uri="62260777-03a2-4acd-8b7f-b7cc27a56620"/>
+    <ds:schemaRef ds:uri="http://purl.org/dc/elements/1.1/"/>
+    <ds:schemaRef ds:uri="http://schemas.microsoft.com/office/infopath/2007/PartnerControls"/>
+    <ds:schemaRef ds:uri="http://www.w3.org/XML/1998/namespace"/>
+    <ds:schemaRef ds:uri="http://purl.org/dc/dcmitype/"/>
+  </ds:schemaRefs>
+</ds:datastoreItem>
+</file>
+
+<file path=customXml/itemProps3.xml><?xml version="1.0" encoding="utf-8"?>
 <ds:datastoreItem xmlns:ds="http://schemas.openxmlformats.org/officeDocument/2006/customXml" ds:itemID="{0FAB4FB0-A6B2-4ED4-9E43-2042FF563FD8}">
   <ds:schemaRefs>
     <ds:schemaRef ds:uri="http://schemas.microsoft.com/office/2006/metadata/contentType"/>
@@ -20065,21 +20661,4 @@
     <ds:schemaRef ds:uri="http://schemas.microsoft.com/internal/obd"/>
   </ds:schemaRefs>
 </ds:datastoreItem>
-</file>
-
-<file path=customXml/itemProps3.xml><?xml version="1.0" encoding="utf-8"?>
-<ds:datastoreItem xmlns:ds="http://schemas.openxmlformats.org/officeDocument/2006/customXml" ds:itemID="{69DA0326-C6F9-40A3-894F-6061EE46E132}">
-  <ds:schemaRefs>
-    <ds:schemaRef ds:uri="http://schemas.microsoft.com/office/2006/metadata/properties"/>
-    <ds:schemaRef ds:uri="f2760952-b3bb-408f-ace6-eb1e07642b86"/>
-    <ds:schemaRef ds:uri="http://purl.org/dc/terms/"/>
-    <ds:schemaRef ds:uri="http://schemas.openxmlformats.org/package/2006/metadata/core-properties"/>
-    <ds:schemaRef ds:uri="http://schemas.microsoft.com/office/2006/documentManagement/types"/>
-    <ds:schemaRef ds:uri="62260777-03a2-4acd-8b7f-b7cc27a56620"/>
-    <ds:schemaRef ds:uri="http://purl.org/dc/elements/1.1/"/>
-    <ds:schemaRef ds:uri="http://schemas.microsoft.com/office/infopath/2007/PartnerControls"/>
-    <ds:schemaRef ds:uri="http://www.w3.org/XML/1998/namespace"/>
-    <ds:schemaRef ds:uri="http://purl.org/dc/dcmitype/"/>
-  </ds:schemaRefs>
-</ds:datastoreItem>
 </file>
</xml_diff>